<commit_message>
Changed Error on Slide
</commit_message>
<xml_diff>
--- a/Workshop_Slides/Electronics Workshop (12).pptx
+++ b/Workshop_Slides/Electronics Workshop (12).pptx
@@ -316,7 +316,7 @@
           <a:p>
             <a:fld id="{779E5FCA-DD43-49EF-B29F-A50837916FDF}" type="datetimeFigureOut">
               <a:rPr lang="en-US" smtClean="0"/>
-              <a:t>8/1/2017</a:t>
+              <a:t>8/4/2017</a:t>
             </a:fld>
             <a:endParaRPr lang="en-US"/>
           </a:p>
@@ -510,7 +510,7 @@
           <a:p>
             <a:fld id="{779E5FCA-DD43-49EF-B29F-A50837916FDF}" type="datetimeFigureOut">
               <a:rPr lang="en-US" smtClean="0"/>
-              <a:t>8/1/2017</a:t>
+              <a:t>8/4/2017</a:t>
             </a:fld>
             <a:endParaRPr lang="en-US"/>
           </a:p>
@@ -698,7 +698,7 @@
           <a:p>
             <a:fld id="{779E5FCA-DD43-49EF-B29F-A50837916FDF}" type="datetimeFigureOut">
               <a:rPr lang="en-US" smtClean="0"/>
-              <a:t>8/1/2017</a:t>
+              <a:t>8/4/2017</a:t>
             </a:fld>
             <a:endParaRPr lang="en-US"/>
           </a:p>
@@ -927,7 +927,7 @@
           <a:p>
             <a:fld id="{779E5FCA-DD43-49EF-B29F-A50837916FDF}" type="datetimeFigureOut">
               <a:rPr lang="en-US" smtClean="0"/>
-              <a:t>8/1/2017</a:t>
+              <a:t>8/4/2017</a:t>
             </a:fld>
             <a:endParaRPr lang="en-US"/>
           </a:p>
@@ -1208,7 +1208,7 @@
           <a:p>
             <a:fld id="{779E5FCA-DD43-49EF-B29F-A50837916FDF}" type="datetimeFigureOut">
               <a:rPr lang="en-US" smtClean="0"/>
-              <a:t>8/1/2017</a:t>
+              <a:t>8/4/2017</a:t>
             </a:fld>
             <a:endParaRPr lang="en-US"/>
           </a:p>
@@ -1496,7 +1496,7 @@
           <a:p>
             <a:fld id="{779E5FCA-DD43-49EF-B29F-A50837916FDF}" type="datetimeFigureOut">
               <a:rPr lang="en-US" smtClean="0"/>
-              <a:t>8/1/2017</a:t>
+              <a:t>8/4/2017</a:t>
             </a:fld>
             <a:endParaRPr lang="en-US"/>
           </a:p>
@@ -2050,7 +2050,7 @@
           <a:p>
             <a:fld id="{779E5FCA-DD43-49EF-B29F-A50837916FDF}" type="datetimeFigureOut">
               <a:rPr lang="en-US" smtClean="0"/>
-              <a:t>8/1/2017</a:t>
+              <a:t>8/4/2017</a:t>
             </a:fld>
             <a:endParaRPr lang="en-US"/>
           </a:p>
@@ -2181,7 +2181,7 @@
           <a:p>
             <a:fld id="{779E5FCA-DD43-49EF-B29F-A50837916FDF}" type="datetimeFigureOut">
               <a:rPr lang="en-US" smtClean="0"/>
-              <a:t>8/1/2017</a:t>
+              <a:t>8/4/2017</a:t>
             </a:fld>
             <a:endParaRPr lang="en-US"/>
           </a:p>
@@ -2331,7 +2331,7 @@
           <a:p>
             <a:fld id="{779E5FCA-DD43-49EF-B29F-A50837916FDF}" type="datetimeFigureOut">
               <a:rPr lang="en-US" smtClean="0"/>
-              <a:t>8/1/2017</a:t>
+              <a:t>8/4/2017</a:t>
             </a:fld>
             <a:endParaRPr lang="en-US"/>
           </a:p>
@@ -2652,7 +2652,7 @@
           <a:p>
             <a:fld id="{779E5FCA-DD43-49EF-B29F-A50837916FDF}" type="datetimeFigureOut">
               <a:rPr lang="en-US" smtClean="0"/>
-              <a:t>8/1/2017</a:t>
+              <a:t>8/4/2017</a:t>
             </a:fld>
             <a:endParaRPr lang="en-US"/>
           </a:p>
@@ -2949,7 +2949,7 @@
           <a:p>
             <a:fld id="{779E5FCA-DD43-49EF-B29F-A50837916FDF}" type="datetimeFigureOut">
               <a:rPr lang="en-US" smtClean="0"/>
-              <a:t>8/1/2017</a:t>
+              <a:t>8/4/2017</a:t>
             </a:fld>
             <a:endParaRPr lang="en-US"/>
           </a:p>
@@ -3194,7 +3194,7 @@
           <a:p>
             <a:fld id="{779E5FCA-DD43-49EF-B29F-A50837916FDF}" type="datetimeFigureOut">
               <a:rPr lang="en-US" smtClean="0"/>
-              <a:t>8/1/2017</a:t>
+              <a:t>8/4/2017</a:t>
             </a:fld>
             <a:endParaRPr lang="en-US"/>
           </a:p>
@@ -3699,11 +3699,7 @@
           <a:p>
             <a:r>
               <a:rPr lang="en-US" dirty="0" smtClean="0"/>
-              <a:t>Electronics Workshop (</a:t>
-            </a:r>
-            <a:r>
-              <a:rPr lang="en-US" dirty="0" smtClean="0"/>
-              <a:t>12)</a:t>
+              <a:t>Electronics Workshop (12)</a:t>
             </a:r>
             <a:endParaRPr lang="en-US" dirty="0"/>
           </a:p>
@@ -3726,11 +3722,7 @@
           <a:p>
             <a:r>
               <a:rPr lang="en-US" dirty="0" smtClean="0"/>
-              <a:t>2017 </a:t>
-            </a:r>
-            <a:r>
-              <a:rPr lang="en-US" dirty="0" smtClean="0"/>
-              <a:t>August 4</a:t>
+              <a:t>2017 August 4</a:t>
             </a:r>
             <a:r>
               <a:rPr lang="en-US" baseline="30000" dirty="0" smtClean="0"/>
@@ -3741,11 +3733,7 @@
           <a:p>
             <a:r>
               <a:rPr lang="en-US" dirty="0" smtClean="0"/>
-              <a:t>Arduino Week </a:t>
-            </a:r>
-            <a:r>
-              <a:rPr lang="en-US" dirty="0" smtClean="0"/>
-              <a:t>(6)</a:t>
+              <a:t>Arduino Week (6)</a:t>
             </a:r>
             <a:endParaRPr lang="en-US" dirty="0"/>
           </a:p>
@@ -3830,7 +3818,6 @@
               <a:rPr lang="en-US" dirty="0" smtClean="0"/>
               <a:t>Works_009</a:t>
             </a:r>
-            <a:endParaRPr lang="en-US" dirty="0" smtClean="0"/>
           </a:p>
           <a:p>
             <a:pPr lvl="1"/>
@@ -3838,14 +3825,12 @@
               <a:rPr lang="en-US" dirty="0" smtClean="0"/>
               <a:t>Using what we know</a:t>
             </a:r>
-            <a:endParaRPr lang="en-US" dirty="0" smtClean="0"/>
           </a:p>
           <a:p>
             <a:r>
               <a:rPr lang="en-US" dirty="0" smtClean="0"/>
               <a:t>Works_010</a:t>
             </a:r>
-            <a:endParaRPr lang="en-US" dirty="0" smtClean="0"/>
           </a:p>
           <a:p>
             <a:pPr lvl="1"/>
@@ -3940,7 +3925,7 @@
             <p:ph idx="1"/>
             <p:extLst>
               <p:ext uri="{D42A27DB-BD31-4B8C-83A1-F6EECF244321}">
-                <p14:modId xmlns:p14="http://schemas.microsoft.com/office/powerpoint/2010/main" val="1081585904"/>
+                <p14:modId xmlns:p14="http://schemas.microsoft.com/office/powerpoint/2010/main" val="154959797"/>
               </p:ext>
             </p:extLst>
           </p:nvPr>
@@ -4290,7 +4275,11 @@
                     <a:p>
                       <a:r>
                         <a:rPr lang="en-US" dirty="0" smtClean="0"/>
-                        <a:t>LED OFF</a:t>
+                        <a:t>LED </a:t>
+                      </a:r>
+                      <a:r>
+                        <a:rPr lang="en-US" dirty="0" smtClean="0"/>
+                        <a:t>ON</a:t>
                       </a:r>
                       <a:endParaRPr lang="en-US" dirty="0"/>
                     </a:p>
@@ -4669,8 +4658,12 @@
                     <a:lstStyle/>
                     <a:p>
                       <a:r>
-                        <a:rPr lang="en-US" dirty="0" smtClean="0"/>
-                        <a:t>LED OFF</a:t>
+                        <a:rPr lang="en-US" smtClean="0"/>
+                        <a:t>LED </a:t>
+                      </a:r>
+                      <a:r>
+                        <a:rPr lang="en-US" smtClean="0"/>
+                        <a:t>ON</a:t>
                       </a:r>
                       <a:endParaRPr lang="en-US" dirty="0"/>
                     </a:p>

</xml_diff>